<commit_message>
created the control systems examples in daily life microsim
</commit_message>
<xml_diff>
--- a/slides/Figures.pptx
+++ b/slides/Figures.pptx
@@ -3321,56 +3321,37 @@
           <a:chExt cx="0" cy="0"/>
         </a:xfrm>
       </p:grpSpPr>
-      <p:sp>
-        <p:nvSpPr>
-          <p:cNvPr id="2" name="Title 1">
-            <a:extLst>
-              <a:ext uri="{FF2B5EF4-FFF2-40B4-BE49-F238E27FC236}">
-                <a16:creationId xmlns:a16="http://schemas.microsoft.com/office/drawing/2014/main" id="{2453AE97-E108-36C7-CC1B-C50192DF2118}"/>
-              </a:ext>
-            </a:extLst>
-          </p:cNvPr>
-          <p:cNvSpPr>
-            <a:spLocks noGrp="1"/>
-          </p:cNvSpPr>
-          <p:nvPr>
-            <p:ph type="ctrTitle"/>
-          </p:nvPr>
-        </p:nvSpPr>
-        <p:spPr/>
-        <p:txBody>
-          <a:bodyPr/>
-          <a:lstStyle/>
-          <a:p>
-            <a:endParaRPr lang="en-US"/>
-          </a:p>
-        </p:txBody>
-      </p:sp>
-      <p:sp>
-        <p:nvSpPr>
-          <p:cNvPr id="3" name="Subtitle 2">
-            <a:extLst>
-              <a:ext uri="{FF2B5EF4-FFF2-40B4-BE49-F238E27FC236}">
-                <a16:creationId xmlns:a16="http://schemas.microsoft.com/office/drawing/2014/main" id="{EC26CD9A-408F-DFDD-4258-81737737905D}"/>
-              </a:ext>
-            </a:extLst>
-          </p:cNvPr>
-          <p:cNvSpPr>
-            <a:spLocks noGrp="1"/>
-          </p:cNvSpPr>
-          <p:nvPr>
-            <p:ph type="subTitle" idx="1"/>
-          </p:nvPr>
-        </p:nvSpPr>
-        <p:spPr/>
-        <p:txBody>
-          <a:bodyPr/>
-          <a:lstStyle/>
-          <a:p>
-            <a:endParaRPr lang="en-US"/>
-          </a:p>
-        </p:txBody>
-      </p:sp>
+      <p:pic>
+        <p:nvPicPr>
+          <p:cNvPr id="7" name="Picture 6" descr="A cartoon of a robot&#10;&#10;AI-generated content may be incorrect.">
+            <a:extLst>
+              <a:ext uri="{FF2B5EF4-FFF2-40B4-BE49-F238E27FC236}">
+                <a16:creationId xmlns:a16="http://schemas.microsoft.com/office/drawing/2014/main" id="{A508E611-0D10-2C4F-9E4C-A2C38A7F0197}"/>
+              </a:ext>
+            </a:extLst>
+          </p:cNvPr>
+          <p:cNvPicPr>
+            <a:picLocks noChangeAspect="1"/>
+          </p:cNvPicPr>
+          <p:nvPr/>
+        </p:nvPicPr>
+        <p:blipFill>
+          <a:blip r:embed="rId2"/>
+          <a:srcRect l="7369" t="7336" r="8066" b="17064"/>
+          <a:stretch>
+            <a:fillRect/>
+          </a:stretch>
+        </p:blipFill>
+        <p:spPr>
+          <a:xfrm>
+            <a:off x="3323968" y="654907"/>
+            <a:ext cx="5498756" cy="5016844"/>
+          </a:xfrm>
+          <a:prstGeom prst="rect">
+            <a:avLst/>
+          </a:prstGeom>
+        </p:spPr>
+      </p:pic>
     </p:spTree>
     <p:extLst>
       <p:ext uri="{BB962C8B-B14F-4D97-AF65-F5344CB8AC3E}">

</xml_diff>